<commit_message>
Added Timeline to PPT
</commit_message>
<xml_diff>
--- a/PPT/pres3.pptx
+++ b/PPT/pres3.pptx
@@ -3889,28 +3889,7 @@
                 <a:latin typeface="+mj-lt"/>
                 <a:cs typeface="Aharoni" panose="02010803020104030203" pitchFamily="2" charset="-79"/>
               </a:rPr>
-              <a:t>Phrase extraction is </a:t>
-            </a:r>
-            <a:r>
-              <a:rPr lang="en-US" sz="2000" dirty="0" smtClean="0">
-                <a:latin typeface="+mj-lt"/>
-                <a:cs typeface="Aharoni" panose="02010803020104030203" pitchFamily="2" charset="-79"/>
-              </a:rPr>
-              <a:t>implicit – not </a:t>
-            </a:r>
-            <a:r>
-              <a:rPr lang="en-US" sz="2000" dirty="0" smtClean="0">
-                <a:latin typeface="+mj-lt"/>
-                <a:cs typeface="Aharoni" panose="02010803020104030203" pitchFamily="2" charset="-79"/>
-              </a:rPr>
-              <a:t>specific</a:t>
-            </a:r>
-            <a:r>
-              <a:rPr lang="en-US" sz="2000" dirty="0" smtClean="0">
-                <a:latin typeface="+mj-lt"/>
-                <a:cs typeface="Aharoni" panose="02010803020104030203" pitchFamily="2" charset="-79"/>
-              </a:rPr>
-              <a:t>.</a:t>
+              <a:t>Phrase extraction is implicit – not specific.</a:t>
             </a:r>
           </a:p>
           <a:p>
@@ -3973,6 +3952,289 @@
             <a:endParaRPr lang="en-US" sz="2000" dirty="0">
               <a:latin typeface="+mj-lt"/>
               <a:cs typeface="Aharoni" panose="02010803020104030203" pitchFamily="2" charset="-79"/>
+            </a:endParaRPr>
+          </a:p>
+        </p:txBody>
+      </p:sp>
+      <p:sp>
+        <p:nvSpPr>
+          <p:cNvPr id="2" name="Right Arrow 1"/>
+          <p:cNvSpPr/>
+          <p:nvPr/>
+        </p:nvSpPr>
+        <p:spPr>
+          <a:xfrm>
+            <a:off x="304800" y="5715000"/>
+            <a:ext cx="8610600" cy="457200"/>
+          </a:xfrm>
+          <a:prstGeom prst="rightArrow">
+            <a:avLst/>
+          </a:prstGeom>
+        </p:spPr>
+        <p:style>
+          <a:lnRef idx="2">
+            <a:schemeClr val="accent1">
+              <a:shade val="50000"/>
+            </a:schemeClr>
+          </a:lnRef>
+          <a:fillRef idx="1">
+            <a:schemeClr val="accent1"/>
+          </a:fillRef>
+          <a:effectRef idx="0">
+            <a:schemeClr val="accent1"/>
+          </a:effectRef>
+          <a:fontRef idx="minor">
+            <a:schemeClr val="lt1"/>
+          </a:fontRef>
+        </p:style>
+        <p:txBody>
+          <a:bodyPr rtlCol="0" anchor="ctr"/>
+          <a:lstStyle/>
+          <a:p>
+            <a:r>
+              <a:rPr lang="en-US" dirty="0" smtClean="0"/>
+              <a:t>May26		June5			      June20		  July19</a:t>
+            </a:r>
+            <a:endParaRPr lang="en-US" dirty="0"/>
+          </a:p>
+        </p:txBody>
+      </p:sp>
+      <p:sp>
+        <p:nvSpPr>
+          <p:cNvPr id="3" name="Rounded Rectangular Callout 2"/>
+          <p:cNvSpPr/>
+          <p:nvPr/>
+        </p:nvSpPr>
+        <p:spPr>
+          <a:xfrm>
+            <a:off x="38100" y="4572000"/>
+            <a:ext cx="1295400" cy="1066800"/>
+          </a:xfrm>
+          <a:prstGeom prst="wedgeRoundRectCallout">
+            <a:avLst/>
+          </a:prstGeom>
+          <a:solidFill>
+            <a:schemeClr val="accent5">
+              <a:lumMod val="40000"/>
+              <a:lumOff val="60000"/>
+            </a:schemeClr>
+          </a:solidFill>
+        </p:spPr>
+        <p:style>
+          <a:lnRef idx="2">
+            <a:schemeClr val="accent1">
+              <a:shade val="50000"/>
+            </a:schemeClr>
+          </a:lnRef>
+          <a:fillRef idx="1">
+            <a:schemeClr val="accent1"/>
+          </a:fillRef>
+          <a:effectRef idx="0">
+            <a:schemeClr val="accent1"/>
+          </a:effectRef>
+          <a:fontRef idx="minor">
+            <a:schemeClr val="lt1"/>
+          </a:fontRef>
+        </p:style>
+        <p:txBody>
+          <a:bodyPr rtlCol="0" anchor="ctr"/>
+          <a:lstStyle/>
+          <a:p>
+            <a:pPr algn="ctr"/>
+            <a:r>
+              <a:rPr lang="en-US" sz="1600" dirty="0" smtClean="0">
+                <a:solidFill>
+                  <a:schemeClr val="tx1"/>
+                </a:solidFill>
+                <a:latin typeface="Arial Narrow" panose="020B0606020202030204" pitchFamily="34" charset="0"/>
+              </a:rPr>
+              <a:t>Get familiar with Tools and Language</a:t>
+            </a:r>
+            <a:endParaRPr lang="en-US" sz="1600" dirty="0">
+              <a:solidFill>
+                <a:schemeClr val="tx1"/>
+              </a:solidFill>
+              <a:latin typeface="Arial Narrow" panose="020B0606020202030204" pitchFamily="34" charset="0"/>
+            </a:endParaRPr>
+          </a:p>
+        </p:txBody>
+      </p:sp>
+      <p:sp>
+        <p:nvSpPr>
+          <p:cNvPr id="4" name="Rounded Rectangular Callout 3"/>
+          <p:cNvSpPr/>
+          <p:nvPr/>
+        </p:nvSpPr>
+        <p:spPr>
+          <a:xfrm>
+            <a:off x="1888671" y="4495800"/>
+            <a:ext cx="1600200" cy="1143000"/>
+          </a:xfrm>
+          <a:prstGeom prst="wedgeRoundRectCallout">
+            <a:avLst/>
+          </a:prstGeom>
+          <a:solidFill>
+            <a:schemeClr val="accent5">
+              <a:lumMod val="40000"/>
+              <a:lumOff val="60000"/>
+            </a:schemeClr>
+          </a:solidFill>
+        </p:spPr>
+        <p:style>
+          <a:lnRef idx="2">
+            <a:schemeClr val="accent1">
+              <a:shade val="50000"/>
+            </a:schemeClr>
+          </a:lnRef>
+          <a:fillRef idx="1">
+            <a:schemeClr val="accent1"/>
+          </a:fillRef>
+          <a:effectRef idx="0">
+            <a:schemeClr val="accent1"/>
+          </a:effectRef>
+          <a:fontRef idx="minor">
+            <a:schemeClr val="lt1"/>
+          </a:fontRef>
+        </p:style>
+        <p:txBody>
+          <a:bodyPr rtlCol="0" anchor="ctr"/>
+          <a:lstStyle/>
+          <a:p>
+            <a:pPr algn="ctr"/>
+            <a:r>
+              <a:rPr lang="en-US" dirty="0" smtClean="0">
+                <a:solidFill>
+                  <a:schemeClr val="tx1"/>
+                </a:solidFill>
+                <a:latin typeface="Arial Narrow" panose="020B0606020202030204" pitchFamily="34" charset="0"/>
+              </a:rPr>
+              <a:t>Documentation and Design</a:t>
+            </a:r>
+            <a:endParaRPr lang="en-US" dirty="0">
+              <a:solidFill>
+                <a:schemeClr val="tx1"/>
+              </a:solidFill>
+              <a:latin typeface="Arial Narrow" panose="020B0606020202030204" pitchFamily="34" charset="0"/>
+            </a:endParaRPr>
+          </a:p>
+        </p:txBody>
+      </p:sp>
+      <p:sp>
+        <p:nvSpPr>
+          <p:cNvPr id="5" name="Rounded Rectangular Callout 4"/>
+          <p:cNvSpPr/>
+          <p:nvPr/>
+        </p:nvSpPr>
+        <p:spPr>
+          <a:xfrm>
+            <a:off x="5105400" y="4533900"/>
+            <a:ext cx="1524000" cy="1066800"/>
+          </a:xfrm>
+          <a:prstGeom prst="wedgeRoundRectCallout">
+            <a:avLst/>
+          </a:prstGeom>
+          <a:solidFill>
+            <a:schemeClr val="accent5">
+              <a:lumMod val="40000"/>
+              <a:lumOff val="60000"/>
+            </a:schemeClr>
+          </a:solidFill>
+        </p:spPr>
+        <p:style>
+          <a:lnRef idx="2">
+            <a:schemeClr val="accent1">
+              <a:shade val="50000"/>
+            </a:schemeClr>
+          </a:lnRef>
+          <a:fillRef idx="1">
+            <a:schemeClr val="accent1"/>
+          </a:fillRef>
+          <a:effectRef idx="0">
+            <a:schemeClr val="accent1"/>
+          </a:effectRef>
+          <a:fontRef idx="minor">
+            <a:schemeClr val="lt1"/>
+          </a:fontRef>
+        </p:style>
+        <p:txBody>
+          <a:bodyPr rtlCol="0" anchor="ctr"/>
+          <a:lstStyle/>
+          <a:p>
+            <a:pPr algn="ctr"/>
+            <a:r>
+              <a:rPr lang="en-US" dirty="0" smtClean="0">
+                <a:solidFill>
+                  <a:schemeClr val="tx1"/>
+                </a:solidFill>
+                <a:latin typeface="Arial Narrow" panose="020B0606020202030204" pitchFamily="34" charset="0"/>
+              </a:rPr>
+              <a:t>Coding and Testing</a:t>
+            </a:r>
+            <a:endParaRPr lang="en-US" dirty="0">
+              <a:solidFill>
+                <a:schemeClr val="tx1"/>
+              </a:solidFill>
+              <a:latin typeface="Arial Narrow" panose="020B0606020202030204" pitchFamily="34" charset="0"/>
+            </a:endParaRPr>
+          </a:p>
+        </p:txBody>
+      </p:sp>
+      <p:sp>
+        <p:nvSpPr>
+          <p:cNvPr id="6" name="Rounded Rectangular Callout 5"/>
+          <p:cNvSpPr/>
+          <p:nvPr/>
+        </p:nvSpPr>
+        <p:spPr>
+          <a:xfrm>
+            <a:off x="7620000" y="3810000"/>
+            <a:ext cx="1371600" cy="1752600"/>
+          </a:xfrm>
+          <a:prstGeom prst="wedgeRoundRectCallout">
+            <a:avLst/>
+          </a:prstGeom>
+          <a:solidFill>
+            <a:schemeClr val="accent5">
+              <a:lumMod val="40000"/>
+              <a:lumOff val="60000"/>
+            </a:schemeClr>
+          </a:solidFill>
+        </p:spPr>
+        <p:style>
+          <a:lnRef idx="2">
+            <a:schemeClr val="accent1">
+              <a:shade val="50000"/>
+            </a:schemeClr>
+          </a:lnRef>
+          <a:fillRef idx="1">
+            <a:schemeClr val="accent1"/>
+          </a:fillRef>
+          <a:effectRef idx="0">
+            <a:schemeClr val="accent1"/>
+          </a:effectRef>
+          <a:fontRef idx="minor">
+            <a:schemeClr val="lt1"/>
+          </a:fontRef>
+        </p:style>
+        <p:txBody>
+          <a:bodyPr rtlCol="0" anchor="ctr"/>
+          <a:lstStyle/>
+          <a:p>
+            <a:pPr algn="ctr"/>
+            <a:r>
+              <a:rPr lang="en-US" dirty="0" smtClean="0">
+                <a:solidFill>
+                  <a:schemeClr val="tx1"/>
+                </a:solidFill>
+                <a:latin typeface="Arial Narrow" panose="020B0606020202030204" pitchFamily="34" charset="0"/>
+              </a:rPr>
+              <a:t>Improving Accuracy and Adding Features</a:t>
+            </a:r>
+            <a:endParaRPr lang="en-US" dirty="0">
+              <a:solidFill>
+                <a:schemeClr val="tx1"/>
+              </a:solidFill>
+              <a:latin typeface="Arial Narrow" panose="020B0606020202030204" pitchFamily="34" charset="0"/>
             </a:endParaRPr>
           </a:p>
         </p:txBody>

</xml_diff>